<commit_message>
Borrador de la presentación para el cuarto avance
</commit_message>
<xml_diff>
--- a/Expo.pptx
+++ b/Expo.pptx
@@ -4,15 +4,27 @@
   <p:sldMasterIdLst>
     <p:sldMasterId id="2147483792" r:id="rId1"/>
   </p:sldMasterIdLst>
+  <p:notesMasterIdLst>
+    <p:notesMasterId r:id="rId19"/>
+  </p:notesMasterIdLst>
   <p:sldIdLst>
     <p:sldId id="256" r:id="rId2"/>
     <p:sldId id="257" r:id="rId3"/>
-    <p:sldId id="258" r:id="rId4"/>
-    <p:sldId id="259" r:id="rId5"/>
-    <p:sldId id="260" r:id="rId6"/>
-    <p:sldId id="261" r:id="rId7"/>
-    <p:sldId id="262" r:id="rId8"/>
-    <p:sldId id="263" r:id="rId9"/>
+    <p:sldId id="264" r:id="rId4"/>
+    <p:sldId id="260" r:id="rId5"/>
+    <p:sldId id="261" r:id="rId6"/>
+    <p:sldId id="274" r:id="rId7"/>
+    <p:sldId id="259" r:id="rId8"/>
+    <p:sldId id="262" r:id="rId9"/>
+    <p:sldId id="265" r:id="rId10"/>
+    <p:sldId id="266" r:id="rId11"/>
+    <p:sldId id="267" r:id="rId12"/>
+    <p:sldId id="268" r:id="rId13"/>
+    <p:sldId id="273" r:id="rId14"/>
+    <p:sldId id="269" r:id="rId15"/>
+    <p:sldId id="271" r:id="rId16"/>
+    <p:sldId id="270" r:id="rId17"/>
+    <p:sldId id="272" r:id="rId18"/>
   </p:sldIdLst>
   <p:sldSz cx="9144000" cy="6858000" type="screen4x3"/>
   <p:notesSz cx="6858000" cy="9144000"/>
@@ -114,6 +126,434 @@
 </p:presentation>
 </file>
 
+<file path=ppt/notesMasters/notesMaster1.xml><?xml version="1.0" encoding="utf-8"?>
+<p:notesMaster xmlns:a="http://schemas.openxmlformats.org/drawingml/2006/main" xmlns:r="http://schemas.openxmlformats.org/officeDocument/2006/relationships" xmlns:p="http://schemas.openxmlformats.org/presentationml/2006/main">
+  <p:cSld>
+    <p:bg>
+      <p:bgRef idx="1001">
+        <a:schemeClr val="bg1"/>
+      </p:bgRef>
+    </p:bg>
+    <p:spTree>
+      <p:nvGrpSpPr>
+        <p:cNvPr id="1" name=""/>
+        <p:cNvGrpSpPr/>
+        <p:nvPr/>
+      </p:nvGrpSpPr>
+      <p:grpSpPr>
+        <a:xfrm>
+          <a:off x="0" y="0"/>
+          <a:ext cx="0" cy="0"/>
+          <a:chOff x="0" y="0"/>
+          <a:chExt cx="0" cy="0"/>
+        </a:xfrm>
+      </p:grpSpPr>
+      <p:sp>
+        <p:nvSpPr>
+          <p:cNvPr id="2" name="1 Marcador de encabezado"/>
+          <p:cNvSpPr>
+            <a:spLocks noGrp="1"/>
+          </p:cNvSpPr>
+          <p:nvPr>
+            <p:ph type="hdr" sz="quarter"/>
+          </p:nvPr>
+        </p:nvSpPr>
+        <p:spPr>
+          <a:xfrm>
+            <a:off x="0" y="0"/>
+            <a:ext cx="2971800" cy="457200"/>
+          </a:xfrm>
+          <a:prstGeom prst="rect">
+            <a:avLst/>
+          </a:prstGeom>
+        </p:spPr>
+        <p:txBody>
+          <a:bodyPr vert="horz" lIns="91440" tIns="45720" rIns="91440" bIns="45720" rtlCol="0"/>
+          <a:lstStyle>
+            <a:lvl1pPr algn="l">
+              <a:defRPr sz="1200"/>
+            </a:lvl1pPr>
+          </a:lstStyle>
+          <a:p>
+            <a:endParaRPr lang="es-HN"/>
+          </a:p>
+        </p:txBody>
+      </p:sp>
+      <p:sp>
+        <p:nvSpPr>
+          <p:cNvPr id="3" name="2 Marcador de fecha"/>
+          <p:cNvSpPr>
+            <a:spLocks noGrp="1"/>
+          </p:cNvSpPr>
+          <p:nvPr>
+            <p:ph type="dt" idx="1"/>
+          </p:nvPr>
+        </p:nvSpPr>
+        <p:spPr>
+          <a:xfrm>
+            <a:off x="3884613" y="0"/>
+            <a:ext cx="2971800" cy="457200"/>
+          </a:xfrm>
+          <a:prstGeom prst="rect">
+            <a:avLst/>
+          </a:prstGeom>
+        </p:spPr>
+        <p:txBody>
+          <a:bodyPr vert="horz" lIns="91440" tIns="45720" rIns="91440" bIns="45720" rtlCol="0"/>
+          <a:lstStyle>
+            <a:lvl1pPr algn="r">
+              <a:defRPr sz="1200"/>
+            </a:lvl1pPr>
+          </a:lstStyle>
+          <a:p>
+            <a:fld id="{C9153C30-4F9A-493B-9B61-0D1DCEB44C71}" type="datetimeFigureOut">
+              <a:rPr lang="es-HN" smtClean="0"/>
+              <a:t>12/03/2010</a:t>
+            </a:fld>
+            <a:endParaRPr lang="es-HN"/>
+          </a:p>
+        </p:txBody>
+      </p:sp>
+      <p:sp>
+        <p:nvSpPr>
+          <p:cNvPr id="4" name="3 Marcador de imagen de diapositiva"/>
+          <p:cNvSpPr>
+            <a:spLocks noGrp="1" noRot="1" noChangeAspect="1"/>
+          </p:cNvSpPr>
+          <p:nvPr>
+            <p:ph type="sldImg" idx="2"/>
+          </p:nvPr>
+        </p:nvSpPr>
+        <p:spPr>
+          <a:xfrm>
+            <a:off x="1143000" y="685800"/>
+            <a:ext cx="4572000" cy="3429000"/>
+          </a:xfrm>
+          <a:prstGeom prst="rect">
+            <a:avLst/>
+          </a:prstGeom>
+          <a:noFill/>
+          <a:ln w="12700">
+            <a:solidFill>
+              <a:prstClr val="black"/>
+            </a:solidFill>
+          </a:ln>
+        </p:spPr>
+        <p:txBody>
+          <a:bodyPr vert="horz" lIns="91440" tIns="45720" rIns="91440" bIns="45720" rtlCol="0" anchor="ctr"/>
+          <a:lstStyle/>
+          <a:p>
+            <a:endParaRPr lang="es-HN"/>
+          </a:p>
+        </p:txBody>
+      </p:sp>
+      <p:sp>
+        <p:nvSpPr>
+          <p:cNvPr id="5" name="4 Marcador de notas"/>
+          <p:cNvSpPr>
+            <a:spLocks noGrp="1"/>
+          </p:cNvSpPr>
+          <p:nvPr>
+            <p:ph type="body" sz="quarter" idx="3"/>
+          </p:nvPr>
+        </p:nvSpPr>
+        <p:spPr>
+          <a:xfrm>
+            <a:off x="685800" y="4343400"/>
+            <a:ext cx="5486400" cy="4114800"/>
+          </a:xfrm>
+          <a:prstGeom prst="rect">
+            <a:avLst/>
+          </a:prstGeom>
+        </p:spPr>
+        <p:txBody>
+          <a:bodyPr vert="horz" lIns="91440" tIns="45720" rIns="91440" bIns="45720" rtlCol="0">
+            <a:normAutofit/>
+          </a:bodyPr>
+          <a:lstStyle/>
+          <a:p>
+            <a:pPr lvl="0"/>
+            <a:r>
+              <a:rPr lang="es-ES" smtClean="0"/>
+              <a:t>Haga clic para modificar el estilo de texto del patrón</a:t>
+            </a:r>
+          </a:p>
+          <a:p>
+            <a:pPr lvl="1"/>
+            <a:r>
+              <a:rPr lang="es-ES" smtClean="0"/>
+              <a:t>Segundo nivel</a:t>
+            </a:r>
+          </a:p>
+          <a:p>
+            <a:pPr lvl="2"/>
+            <a:r>
+              <a:rPr lang="es-ES" smtClean="0"/>
+              <a:t>Tercer nivel</a:t>
+            </a:r>
+          </a:p>
+          <a:p>
+            <a:pPr lvl="3"/>
+            <a:r>
+              <a:rPr lang="es-ES" smtClean="0"/>
+              <a:t>Cuarto nivel</a:t>
+            </a:r>
+          </a:p>
+          <a:p>
+            <a:pPr lvl="4"/>
+            <a:r>
+              <a:rPr lang="es-ES" smtClean="0"/>
+              <a:t>Quinto nivel</a:t>
+            </a:r>
+            <a:endParaRPr lang="es-HN"/>
+          </a:p>
+        </p:txBody>
+      </p:sp>
+      <p:sp>
+        <p:nvSpPr>
+          <p:cNvPr id="6" name="5 Marcador de pie de página"/>
+          <p:cNvSpPr>
+            <a:spLocks noGrp="1"/>
+          </p:cNvSpPr>
+          <p:nvPr>
+            <p:ph type="ftr" sz="quarter" idx="4"/>
+          </p:nvPr>
+        </p:nvSpPr>
+        <p:spPr>
+          <a:xfrm>
+            <a:off x="0" y="8685213"/>
+            <a:ext cx="2971800" cy="457200"/>
+          </a:xfrm>
+          <a:prstGeom prst="rect">
+            <a:avLst/>
+          </a:prstGeom>
+        </p:spPr>
+        <p:txBody>
+          <a:bodyPr vert="horz" lIns="91440" tIns="45720" rIns="91440" bIns="45720" rtlCol="0" anchor="b"/>
+          <a:lstStyle>
+            <a:lvl1pPr algn="l">
+              <a:defRPr sz="1200"/>
+            </a:lvl1pPr>
+          </a:lstStyle>
+          <a:p>
+            <a:endParaRPr lang="es-HN"/>
+          </a:p>
+        </p:txBody>
+      </p:sp>
+      <p:sp>
+        <p:nvSpPr>
+          <p:cNvPr id="7" name="6 Marcador de número de diapositiva"/>
+          <p:cNvSpPr>
+            <a:spLocks noGrp="1"/>
+          </p:cNvSpPr>
+          <p:nvPr>
+            <p:ph type="sldNum" sz="quarter" idx="5"/>
+          </p:nvPr>
+        </p:nvSpPr>
+        <p:spPr>
+          <a:xfrm>
+            <a:off x="3884613" y="8685213"/>
+            <a:ext cx="2971800" cy="457200"/>
+          </a:xfrm>
+          <a:prstGeom prst="rect">
+            <a:avLst/>
+          </a:prstGeom>
+        </p:spPr>
+        <p:txBody>
+          <a:bodyPr vert="horz" lIns="91440" tIns="45720" rIns="91440" bIns="45720" rtlCol="0" anchor="b"/>
+          <a:lstStyle>
+            <a:lvl1pPr algn="r">
+              <a:defRPr sz="1200"/>
+            </a:lvl1pPr>
+          </a:lstStyle>
+          <a:p>
+            <a:fld id="{3A2D96B6-025E-4A70-97D5-00A3D314FF75}" type="slidenum">
+              <a:rPr lang="es-HN" smtClean="0"/>
+              <a:t>‹Nº›</a:t>
+            </a:fld>
+            <a:endParaRPr lang="es-HN"/>
+          </a:p>
+        </p:txBody>
+      </p:sp>
+    </p:spTree>
+  </p:cSld>
+  <p:clrMap bg1="lt1" tx1="dk1" bg2="lt2" tx2="dk2" accent1="accent1" accent2="accent2" accent3="accent3" accent4="accent4" accent5="accent5" accent6="accent6" hlink="hlink" folHlink="folHlink"/>
+  <p:notesStyle>
+    <a:lvl1pPr marL="0" algn="l" defTabSz="914400" rtl="0" eaLnBrk="1" latinLnBrk="0" hangingPunct="1">
+      <a:defRPr sz="1200" kern="1200">
+        <a:solidFill>
+          <a:schemeClr val="tx1"/>
+        </a:solidFill>
+        <a:latin typeface="+mn-lt"/>
+        <a:ea typeface="+mn-ea"/>
+        <a:cs typeface="+mn-cs"/>
+      </a:defRPr>
+    </a:lvl1pPr>
+    <a:lvl2pPr marL="457200" algn="l" defTabSz="914400" rtl="0" eaLnBrk="1" latinLnBrk="0" hangingPunct="1">
+      <a:defRPr sz="1200" kern="1200">
+        <a:solidFill>
+          <a:schemeClr val="tx1"/>
+        </a:solidFill>
+        <a:latin typeface="+mn-lt"/>
+        <a:ea typeface="+mn-ea"/>
+        <a:cs typeface="+mn-cs"/>
+      </a:defRPr>
+    </a:lvl2pPr>
+    <a:lvl3pPr marL="914400" algn="l" defTabSz="914400" rtl="0" eaLnBrk="1" latinLnBrk="0" hangingPunct="1">
+      <a:defRPr sz="1200" kern="1200">
+        <a:solidFill>
+          <a:schemeClr val="tx1"/>
+        </a:solidFill>
+        <a:latin typeface="+mn-lt"/>
+        <a:ea typeface="+mn-ea"/>
+        <a:cs typeface="+mn-cs"/>
+      </a:defRPr>
+    </a:lvl3pPr>
+    <a:lvl4pPr marL="1371600" algn="l" defTabSz="914400" rtl="0" eaLnBrk="1" latinLnBrk="0" hangingPunct="1">
+      <a:defRPr sz="1200" kern="1200">
+        <a:solidFill>
+          <a:schemeClr val="tx1"/>
+        </a:solidFill>
+        <a:latin typeface="+mn-lt"/>
+        <a:ea typeface="+mn-ea"/>
+        <a:cs typeface="+mn-cs"/>
+      </a:defRPr>
+    </a:lvl4pPr>
+    <a:lvl5pPr marL="1828800" algn="l" defTabSz="914400" rtl="0" eaLnBrk="1" latinLnBrk="0" hangingPunct="1">
+      <a:defRPr sz="1200" kern="1200">
+        <a:solidFill>
+          <a:schemeClr val="tx1"/>
+        </a:solidFill>
+        <a:latin typeface="+mn-lt"/>
+        <a:ea typeface="+mn-ea"/>
+        <a:cs typeface="+mn-cs"/>
+      </a:defRPr>
+    </a:lvl5pPr>
+    <a:lvl6pPr marL="2286000" algn="l" defTabSz="914400" rtl="0" eaLnBrk="1" latinLnBrk="0" hangingPunct="1">
+      <a:defRPr sz="1200" kern="1200">
+        <a:solidFill>
+          <a:schemeClr val="tx1"/>
+        </a:solidFill>
+        <a:latin typeface="+mn-lt"/>
+        <a:ea typeface="+mn-ea"/>
+        <a:cs typeface="+mn-cs"/>
+      </a:defRPr>
+    </a:lvl6pPr>
+    <a:lvl7pPr marL="2743200" algn="l" defTabSz="914400" rtl="0" eaLnBrk="1" latinLnBrk="0" hangingPunct="1">
+      <a:defRPr sz="1200" kern="1200">
+        <a:solidFill>
+          <a:schemeClr val="tx1"/>
+        </a:solidFill>
+        <a:latin typeface="+mn-lt"/>
+        <a:ea typeface="+mn-ea"/>
+        <a:cs typeface="+mn-cs"/>
+      </a:defRPr>
+    </a:lvl7pPr>
+    <a:lvl8pPr marL="3200400" algn="l" defTabSz="914400" rtl="0" eaLnBrk="1" latinLnBrk="0" hangingPunct="1">
+      <a:defRPr sz="1200" kern="1200">
+        <a:solidFill>
+          <a:schemeClr val="tx1"/>
+        </a:solidFill>
+        <a:latin typeface="+mn-lt"/>
+        <a:ea typeface="+mn-ea"/>
+        <a:cs typeface="+mn-cs"/>
+      </a:defRPr>
+    </a:lvl8pPr>
+    <a:lvl9pPr marL="3657600" algn="l" defTabSz="914400" rtl="0" eaLnBrk="1" latinLnBrk="0" hangingPunct="1">
+      <a:defRPr sz="1200" kern="1200">
+        <a:solidFill>
+          <a:schemeClr val="tx1"/>
+        </a:solidFill>
+        <a:latin typeface="+mn-lt"/>
+        <a:ea typeface="+mn-ea"/>
+        <a:cs typeface="+mn-cs"/>
+      </a:defRPr>
+    </a:lvl9pPr>
+  </p:notesStyle>
+</p:notesMaster>
+</file>
+
+<file path=ppt/notesSlides/notesSlide1.xml><?xml version="1.0" encoding="utf-8"?>
+<p:notes xmlns:a="http://schemas.openxmlformats.org/drawingml/2006/main" xmlns:r="http://schemas.openxmlformats.org/officeDocument/2006/relationships" xmlns:p="http://schemas.openxmlformats.org/presentationml/2006/main">
+  <p:cSld>
+    <p:spTree>
+      <p:nvGrpSpPr>
+        <p:cNvPr id="1" name=""/>
+        <p:cNvGrpSpPr/>
+        <p:nvPr/>
+      </p:nvGrpSpPr>
+      <p:grpSpPr>
+        <a:xfrm>
+          <a:off x="0" y="0"/>
+          <a:ext cx="0" cy="0"/>
+          <a:chOff x="0" y="0"/>
+          <a:chExt cx="0" cy="0"/>
+        </a:xfrm>
+      </p:grpSpPr>
+      <p:sp>
+        <p:nvSpPr>
+          <p:cNvPr id="2" name="1 Marcador de imagen de diapositiva"/>
+          <p:cNvSpPr>
+            <a:spLocks noGrp="1" noRot="1" noChangeAspect="1"/>
+          </p:cNvSpPr>
+          <p:nvPr>
+            <p:ph type="sldImg"/>
+          </p:nvPr>
+        </p:nvSpPr>
+        <p:spPr/>
+      </p:sp>
+      <p:sp>
+        <p:nvSpPr>
+          <p:cNvPr id="3" name="2 Marcador de notas"/>
+          <p:cNvSpPr>
+            <a:spLocks noGrp="1"/>
+          </p:cNvSpPr>
+          <p:nvPr>
+            <p:ph type="body" idx="1"/>
+          </p:nvPr>
+        </p:nvSpPr>
+        <p:spPr/>
+        <p:txBody>
+          <a:bodyPr>
+            <a:normAutofit/>
+          </a:bodyPr>
+          <a:lstStyle/>
+          <a:p>
+            <a:endParaRPr lang="es-HN" dirty="0"/>
+          </a:p>
+        </p:txBody>
+      </p:sp>
+      <p:sp>
+        <p:nvSpPr>
+          <p:cNvPr id="4" name="3 Marcador de número de diapositiva"/>
+          <p:cNvSpPr>
+            <a:spLocks noGrp="1"/>
+          </p:cNvSpPr>
+          <p:nvPr>
+            <p:ph type="sldNum" sz="quarter" idx="10"/>
+          </p:nvPr>
+        </p:nvSpPr>
+        <p:spPr/>
+        <p:txBody>
+          <a:bodyPr/>
+          <a:lstStyle/>
+          <a:p>
+            <a:fld id="{3A2D96B6-025E-4A70-97D5-00A3D314FF75}" type="slidenum">
+              <a:rPr lang="es-HN" smtClean="0"/>
+              <a:t>15</a:t>
+            </a:fld>
+            <a:endParaRPr lang="es-HN"/>
+          </a:p>
+        </p:txBody>
+      </p:sp>
+    </p:spTree>
+  </p:cSld>
+  <p:clrMapOvr>
+    <a:masterClrMapping/>
+  </p:clrMapOvr>
+</p:notes>
+</file>
+
 <file path=ppt/slideLayouts/slideLayout1.xml><?xml version="1.0" encoding="utf-8"?>
 <p:sldLayout xmlns:a="http://schemas.openxmlformats.org/drawingml/2006/main" xmlns:r="http://schemas.openxmlformats.org/officeDocument/2006/relationships" xmlns:p="http://schemas.openxmlformats.org/presentationml/2006/main" type="title" preserve="1">
   <p:cSld name="Diapositiva de título">
@@ -295,7 +735,8 @@
           <a:p>
             <a:fld id="{080182E8-4CCC-4C22-8B02-6F339A6057CF}" type="datetimeFigureOut">
               <a:rPr lang="es-HN" smtClean="0"/>
-              <a:t>02/03/2010</a:t>
+              <a:pPr/>
+              <a:t>12/03/2010</a:t>
             </a:fld>
             <a:endParaRPr lang="es-HN"/>
           </a:p>
@@ -337,6 +778,7 @@
           <a:p>
             <a:fld id="{683302FF-1BA4-4AFA-88DF-EAB884E37B73}" type="slidenum">
               <a:rPr lang="es-HN" smtClean="0"/>
+              <a:pPr/>
               <a:t>‹Nº›</a:t>
             </a:fld>
             <a:endParaRPr lang="es-HN"/>
@@ -460,7 +902,8 @@
           <a:p>
             <a:fld id="{080182E8-4CCC-4C22-8B02-6F339A6057CF}" type="datetimeFigureOut">
               <a:rPr lang="es-HN" smtClean="0"/>
-              <a:t>02/03/2010</a:t>
+              <a:pPr/>
+              <a:t>12/03/2010</a:t>
             </a:fld>
             <a:endParaRPr lang="es-HN"/>
           </a:p>
@@ -502,6 +945,7 @@
           <a:p>
             <a:fld id="{683302FF-1BA4-4AFA-88DF-EAB884E37B73}" type="slidenum">
               <a:rPr lang="es-HN" smtClean="0"/>
+              <a:pPr/>
               <a:t>‹Nº›</a:t>
             </a:fld>
             <a:endParaRPr lang="es-HN"/>
@@ -635,7 +1079,8 @@
           <a:p>
             <a:fld id="{080182E8-4CCC-4C22-8B02-6F339A6057CF}" type="datetimeFigureOut">
               <a:rPr lang="es-HN" smtClean="0"/>
-              <a:t>02/03/2010</a:t>
+              <a:pPr/>
+              <a:t>12/03/2010</a:t>
             </a:fld>
             <a:endParaRPr lang="es-HN"/>
           </a:p>
@@ -677,6 +1122,7 @@
           <a:p>
             <a:fld id="{683302FF-1BA4-4AFA-88DF-EAB884E37B73}" type="slidenum">
               <a:rPr lang="es-HN" smtClean="0"/>
+              <a:pPr/>
               <a:t>‹Nº›</a:t>
             </a:fld>
             <a:endParaRPr lang="es-HN"/>
@@ -800,7 +1246,8 @@
           <a:p>
             <a:fld id="{080182E8-4CCC-4C22-8B02-6F339A6057CF}" type="datetimeFigureOut">
               <a:rPr lang="es-HN" smtClean="0"/>
-              <a:t>02/03/2010</a:t>
+              <a:pPr/>
+              <a:t>12/03/2010</a:t>
             </a:fld>
             <a:endParaRPr lang="es-HN"/>
           </a:p>
@@ -842,6 +1289,7 @@
           <a:p>
             <a:fld id="{683302FF-1BA4-4AFA-88DF-EAB884E37B73}" type="slidenum">
               <a:rPr lang="es-HN" smtClean="0"/>
+              <a:pPr/>
               <a:t>‹Nº›</a:t>
             </a:fld>
             <a:endParaRPr lang="es-HN"/>
@@ -1041,7 +1489,8 @@
           <a:p>
             <a:fld id="{080182E8-4CCC-4C22-8B02-6F339A6057CF}" type="datetimeFigureOut">
               <a:rPr lang="es-HN" smtClean="0"/>
-              <a:t>02/03/2010</a:t>
+              <a:pPr/>
+              <a:t>12/03/2010</a:t>
             </a:fld>
             <a:endParaRPr lang="es-HN"/>
           </a:p>
@@ -1083,6 +1532,7 @@
           <a:p>
             <a:fld id="{683302FF-1BA4-4AFA-88DF-EAB884E37B73}" type="slidenum">
               <a:rPr lang="es-HN" smtClean="0"/>
+              <a:pPr/>
               <a:t>‹Nº›</a:t>
             </a:fld>
             <a:endParaRPr lang="es-HN"/>
@@ -1324,7 +1774,8 @@
           <a:p>
             <a:fld id="{080182E8-4CCC-4C22-8B02-6F339A6057CF}" type="datetimeFigureOut">
               <a:rPr lang="es-HN" smtClean="0"/>
-              <a:t>02/03/2010</a:t>
+              <a:pPr/>
+              <a:t>12/03/2010</a:t>
             </a:fld>
             <a:endParaRPr lang="es-HN"/>
           </a:p>
@@ -1366,6 +1817,7 @@
           <a:p>
             <a:fld id="{683302FF-1BA4-4AFA-88DF-EAB884E37B73}" type="slidenum">
               <a:rPr lang="es-HN" smtClean="0"/>
+              <a:pPr/>
               <a:t>‹Nº›</a:t>
             </a:fld>
             <a:endParaRPr lang="es-HN"/>
@@ -1741,7 +2193,8 @@
           <a:p>
             <a:fld id="{080182E8-4CCC-4C22-8B02-6F339A6057CF}" type="datetimeFigureOut">
               <a:rPr lang="es-HN" smtClean="0"/>
-              <a:t>02/03/2010</a:t>
+              <a:pPr/>
+              <a:t>12/03/2010</a:t>
             </a:fld>
             <a:endParaRPr lang="es-HN"/>
           </a:p>
@@ -1783,6 +2236,7 @@
           <a:p>
             <a:fld id="{683302FF-1BA4-4AFA-88DF-EAB884E37B73}" type="slidenum">
               <a:rPr lang="es-HN" smtClean="0"/>
+              <a:pPr/>
               <a:t>‹Nº›</a:t>
             </a:fld>
             <a:endParaRPr lang="es-HN"/>
@@ -1854,7 +2308,8 @@
           <a:p>
             <a:fld id="{080182E8-4CCC-4C22-8B02-6F339A6057CF}" type="datetimeFigureOut">
               <a:rPr lang="es-HN" smtClean="0"/>
-              <a:t>02/03/2010</a:t>
+              <a:pPr/>
+              <a:t>12/03/2010</a:t>
             </a:fld>
             <a:endParaRPr lang="es-HN"/>
           </a:p>
@@ -1896,6 +2351,7 @@
           <a:p>
             <a:fld id="{683302FF-1BA4-4AFA-88DF-EAB884E37B73}" type="slidenum">
               <a:rPr lang="es-HN" smtClean="0"/>
+              <a:pPr/>
               <a:t>‹Nº›</a:t>
             </a:fld>
             <a:endParaRPr lang="es-HN"/>
@@ -1944,7 +2400,8 @@
           <a:p>
             <a:fld id="{080182E8-4CCC-4C22-8B02-6F339A6057CF}" type="datetimeFigureOut">
               <a:rPr lang="es-HN" smtClean="0"/>
-              <a:t>02/03/2010</a:t>
+              <a:pPr/>
+              <a:t>12/03/2010</a:t>
             </a:fld>
             <a:endParaRPr lang="es-HN"/>
           </a:p>
@@ -1986,6 +2443,7 @@
           <a:p>
             <a:fld id="{683302FF-1BA4-4AFA-88DF-EAB884E37B73}" type="slidenum">
               <a:rPr lang="es-HN" smtClean="0"/>
+              <a:pPr/>
               <a:t>‹Nº›</a:t>
             </a:fld>
             <a:endParaRPr lang="es-HN"/>
@@ -2216,7 +2674,8 @@
           <a:p>
             <a:fld id="{080182E8-4CCC-4C22-8B02-6F339A6057CF}" type="datetimeFigureOut">
               <a:rPr lang="es-HN" smtClean="0"/>
-              <a:t>02/03/2010</a:t>
+              <a:pPr/>
+              <a:t>12/03/2010</a:t>
             </a:fld>
             <a:endParaRPr lang="es-HN"/>
           </a:p>
@@ -2258,6 +2717,7 @@
           <a:p>
             <a:fld id="{683302FF-1BA4-4AFA-88DF-EAB884E37B73}" type="slidenum">
               <a:rPr lang="es-HN" smtClean="0"/>
+              <a:pPr/>
               <a:t>‹Nº›</a:t>
             </a:fld>
             <a:endParaRPr lang="es-HN"/>
@@ -2464,7 +2924,8 @@
           <a:p>
             <a:fld id="{080182E8-4CCC-4C22-8B02-6F339A6057CF}" type="datetimeFigureOut">
               <a:rPr lang="es-HN" smtClean="0"/>
-              <a:t>02/03/2010</a:t>
+              <a:pPr/>
+              <a:t>12/03/2010</a:t>
             </a:fld>
             <a:endParaRPr lang="es-HN"/>
           </a:p>
@@ -2506,6 +2967,7 @@
           <a:p>
             <a:fld id="{683302FF-1BA4-4AFA-88DF-EAB884E37B73}" type="slidenum">
               <a:rPr lang="es-HN" smtClean="0"/>
+              <a:pPr/>
               <a:t>‹Nº›</a:t>
             </a:fld>
             <a:endParaRPr lang="es-HN"/>
@@ -2672,7 +3134,8 @@
           <a:p>
             <a:fld id="{080182E8-4CCC-4C22-8B02-6F339A6057CF}" type="datetimeFigureOut">
               <a:rPr lang="es-HN" smtClean="0"/>
-              <a:t>02/03/2010</a:t>
+              <a:pPr/>
+              <a:t>12/03/2010</a:t>
             </a:fld>
             <a:endParaRPr lang="es-HN"/>
           </a:p>
@@ -2750,6 +3213,7 @@
           <a:p>
             <a:fld id="{683302FF-1BA4-4AFA-88DF-EAB884E37B73}" type="slidenum">
               <a:rPr lang="es-HN" smtClean="0"/>
+              <a:pPr/>
               <a:t>‹Nº›</a:t>
             </a:fld>
             <a:endParaRPr lang="es-HN"/>
@@ -3106,6 +3570,555 @@
 </p:sld>
 </file>
 
+<file path=ppt/slides/slide10.xml><?xml version="1.0" encoding="utf-8"?>
+<p:sld xmlns:a="http://schemas.openxmlformats.org/drawingml/2006/main" xmlns:r="http://schemas.openxmlformats.org/officeDocument/2006/relationships" xmlns:p="http://schemas.openxmlformats.org/presentationml/2006/main">
+  <p:cSld>
+    <p:spTree>
+      <p:nvGrpSpPr>
+        <p:cNvPr id="1" name=""/>
+        <p:cNvGrpSpPr/>
+        <p:nvPr/>
+      </p:nvGrpSpPr>
+      <p:grpSpPr>
+        <a:xfrm>
+          <a:off x="0" y="0"/>
+          <a:ext cx="0" cy="0"/>
+          <a:chOff x="0" y="0"/>
+          <a:chExt cx="0" cy="0"/>
+        </a:xfrm>
+      </p:grpSpPr>
+      <p:sp>
+        <p:nvSpPr>
+          <p:cNvPr id="2" name="1 Título"/>
+          <p:cNvSpPr>
+            <a:spLocks noGrp="1"/>
+          </p:cNvSpPr>
+          <p:nvPr>
+            <p:ph type="title"/>
+          </p:nvPr>
+        </p:nvSpPr>
+        <p:spPr/>
+        <p:txBody>
+          <a:bodyPr/>
+          <a:lstStyle/>
+          <a:p>
+            <a:r>
+              <a:rPr lang="es-HN" dirty="0" smtClean="0"/>
+              <a:t>La solución: cómo funcionaría</a:t>
+            </a:r>
+            <a:endParaRPr lang="es-HN" dirty="0"/>
+          </a:p>
+        </p:txBody>
+      </p:sp>
+      <p:pic>
+        <p:nvPicPr>
+          <p:cNvPr id="4" name="3 Marcador de contenido" descr="SD_filtering_approach.jpeg"/>
+          <p:cNvPicPr>
+            <a:picLocks noGrp="1" noChangeAspect="1"/>
+          </p:cNvPicPr>
+          <p:nvPr>
+            <p:ph idx="1"/>
+          </p:nvPr>
+        </p:nvPicPr>
+        <p:blipFill>
+          <a:blip r:embed="rId2"/>
+          <a:stretch>
+            <a:fillRect/>
+          </a:stretch>
+        </p:blipFill>
+        <p:spPr>
+          <a:xfrm>
+            <a:off x="457200" y="1936519"/>
+            <a:ext cx="8229600" cy="3853324"/>
+          </a:xfrm>
+        </p:spPr>
+      </p:pic>
+    </p:spTree>
+  </p:cSld>
+  <p:clrMapOvr>
+    <a:masterClrMapping/>
+  </p:clrMapOvr>
+  <p:timing>
+    <p:tnLst>
+      <p:par>
+        <p:cTn id="1" dur="indefinite" restart="never" nodeType="tmRoot"/>
+      </p:par>
+    </p:tnLst>
+  </p:timing>
+</p:sld>
+</file>
+
+<file path=ppt/slides/slide11.xml><?xml version="1.0" encoding="utf-8"?>
+<p:sld xmlns:a="http://schemas.openxmlformats.org/drawingml/2006/main" xmlns:r="http://schemas.openxmlformats.org/officeDocument/2006/relationships" xmlns:p="http://schemas.openxmlformats.org/presentationml/2006/main">
+  <p:cSld>
+    <p:spTree>
+      <p:nvGrpSpPr>
+        <p:cNvPr id="1" name=""/>
+        <p:cNvGrpSpPr/>
+        <p:nvPr/>
+      </p:nvGrpSpPr>
+      <p:grpSpPr>
+        <a:xfrm>
+          <a:off x="0" y="0"/>
+          <a:ext cx="0" cy="0"/>
+          <a:chOff x="0" y="0"/>
+          <a:chExt cx="0" cy="0"/>
+        </a:xfrm>
+      </p:grpSpPr>
+      <p:sp>
+        <p:nvSpPr>
+          <p:cNvPr id="2" name="1 Título"/>
+          <p:cNvSpPr>
+            <a:spLocks noGrp="1"/>
+          </p:cNvSpPr>
+          <p:nvPr>
+            <p:ph type="title"/>
+          </p:nvPr>
+        </p:nvSpPr>
+        <p:spPr/>
+        <p:txBody>
+          <a:bodyPr/>
+          <a:lstStyle/>
+          <a:p>
+            <a:r>
+              <a:rPr lang="es-HN" dirty="0" smtClean="0"/>
+              <a:t>La solución: retos</a:t>
+            </a:r>
+            <a:endParaRPr lang="es-HN" dirty="0"/>
+          </a:p>
+        </p:txBody>
+      </p:sp>
+      <p:sp>
+        <p:nvSpPr>
+          <p:cNvPr id="3" name="2 Marcador de contenido"/>
+          <p:cNvSpPr>
+            <a:spLocks noGrp="1"/>
+          </p:cNvSpPr>
+          <p:nvPr>
+            <p:ph idx="1"/>
+          </p:nvPr>
+        </p:nvSpPr>
+        <p:spPr/>
+        <p:txBody>
+          <a:bodyPr/>
+          <a:lstStyle/>
+          <a:p>
+            <a:r>
+              <a:rPr lang="es-HN" dirty="0" smtClean="0"/>
+              <a:t>Conseguir una colección documental. Una manera de resolverlo: un </a:t>
+            </a:r>
+            <a:r>
+              <a:rPr lang="es-HN" i="1" dirty="0" smtClean="0"/>
+              <a:t>web </a:t>
+            </a:r>
+            <a:r>
+              <a:rPr lang="es-HN" i="1" dirty="0" err="1" smtClean="0"/>
+              <a:t>crawler</a:t>
+            </a:r>
+            <a:r>
+              <a:rPr lang="es-HN" i="1" dirty="0" smtClean="0"/>
+              <a:t>. </a:t>
+            </a:r>
+            <a:r>
+              <a:rPr lang="es-HN" dirty="0" smtClean="0"/>
+              <a:t>En realidad, la gente contribuiría.</a:t>
+            </a:r>
+            <a:endParaRPr lang="es-HN" i="1" dirty="0" smtClean="0"/>
+          </a:p>
+          <a:p>
+            <a:r>
+              <a:rPr lang="es-HN" dirty="0" smtClean="0"/>
+              <a:t>Determinar el contexto inmediato. ¿Extracción de términos local o global?</a:t>
+            </a:r>
+          </a:p>
+          <a:p>
+            <a:r>
+              <a:rPr lang="es-HN" dirty="0" smtClean="0"/>
+              <a:t>Aprender el perfil del usuario. ¿Aprendizaje de máquina o una ontología simple?</a:t>
+            </a:r>
+            <a:endParaRPr lang="es-HN" dirty="0"/>
+          </a:p>
+        </p:txBody>
+      </p:sp>
+    </p:spTree>
+  </p:cSld>
+  <p:clrMapOvr>
+    <a:masterClrMapping/>
+  </p:clrMapOvr>
+  <p:timing>
+    <p:tnLst>
+      <p:par>
+        <p:cTn id="1" dur="indefinite" restart="never" nodeType="tmRoot"/>
+      </p:par>
+    </p:tnLst>
+  </p:timing>
+</p:sld>
+</file>
+
+<file path=ppt/slides/slide12.xml><?xml version="1.0" encoding="utf-8"?>
+<p:sld xmlns:a="http://schemas.openxmlformats.org/drawingml/2006/main" xmlns:r="http://schemas.openxmlformats.org/officeDocument/2006/relationships" xmlns:p="http://schemas.openxmlformats.org/presentationml/2006/main">
+  <p:cSld>
+    <p:spTree>
+      <p:nvGrpSpPr>
+        <p:cNvPr id="1" name=""/>
+        <p:cNvGrpSpPr/>
+        <p:nvPr/>
+      </p:nvGrpSpPr>
+      <p:grpSpPr>
+        <a:xfrm>
+          <a:off x="0" y="0"/>
+          <a:ext cx="0" cy="0"/>
+          <a:chOff x="0" y="0"/>
+          <a:chExt cx="0" cy="0"/>
+        </a:xfrm>
+      </p:grpSpPr>
+      <p:sp>
+        <p:nvSpPr>
+          <p:cNvPr id="4" name="3 Título"/>
+          <p:cNvSpPr>
+            <a:spLocks noGrp="1"/>
+          </p:cNvSpPr>
+          <p:nvPr>
+            <p:ph type="title"/>
+          </p:nvPr>
+        </p:nvSpPr>
+        <p:spPr/>
+        <p:txBody>
+          <a:bodyPr/>
+          <a:lstStyle/>
+          <a:p>
+            <a:r>
+              <a:rPr lang="es-HN" dirty="0" smtClean="0"/>
+              <a:t>¡Gracias por su atención!</a:t>
+            </a:r>
+            <a:endParaRPr lang="es-HN" dirty="0"/>
+          </a:p>
+        </p:txBody>
+      </p:sp>
+    </p:spTree>
+  </p:cSld>
+  <p:clrMapOvr>
+    <a:masterClrMapping/>
+  </p:clrMapOvr>
+</p:sld>
+</file>
+
+<file path=ppt/slides/slide13.xml><?xml version="1.0" encoding="utf-8"?>
+<p:sld xmlns:a="http://schemas.openxmlformats.org/drawingml/2006/main" xmlns:r="http://schemas.openxmlformats.org/officeDocument/2006/relationships" xmlns:p="http://schemas.openxmlformats.org/presentationml/2006/main">
+  <p:cSld>
+    <p:spTree>
+      <p:nvGrpSpPr>
+        <p:cNvPr id="1" name=""/>
+        <p:cNvGrpSpPr/>
+        <p:nvPr/>
+      </p:nvGrpSpPr>
+      <p:grpSpPr>
+        <a:xfrm>
+          <a:off x="0" y="0"/>
+          <a:ext cx="0" cy="0"/>
+          <a:chOff x="0" y="0"/>
+          <a:chExt cx="0" cy="0"/>
+        </a:xfrm>
+      </p:grpSpPr>
+    </p:spTree>
+  </p:cSld>
+  <p:clrMapOvr>
+    <a:masterClrMapping/>
+  </p:clrMapOvr>
+</p:sld>
+</file>
+
+<file path=ppt/slides/slide14.xml><?xml version="1.0" encoding="utf-8"?>
+<p:sld xmlns:a="http://schemas.openxmlformats.org/drawingml/2006/main" xmlns:r="http://schemas.openxmlformats.org/officeDocument/2006/relationships" xmlns:p="http://schemas.openxmlformats.org/presentationml/2006/main">
+  <p:cSld>
+    <p:spTree>
+      <p:nvGrpSpPr>
+        <p:cNvPr id="1" name=""/>
+        <p:cNvGrpSpPr/>
+        <p:nvPr/>
+      </p:nvGrpSpPr>
+      <p:grpSpPr>
+        <a:xfrm>
+          <a:off x="0" y="0"/>
+          <a:ext cx="0" cy="0"/>
+          <a:chOff x="0" y="0"/>
+          <a:chExt cx="0" cy="0"/>
+        </a:xfrm>
+      </p:grpSpPr>
+      <p:sp>
+        <p:nvSpPr>
+          <p:cNvPr id="2" name="1 Título"/>
+          <p:cNvSpPr>
+            <a:spLocks noGrp="1"/>
+          </p:cNvSpPr>
+          <p:nvPr>
+            <p:ph type="title"/>
+          </p:nvPr>
+        </p:nvSpPr>
+        <p:spPr/>
+        <p:txBody>
+          <a:bodyPr/>
+          <a:lstStyle/>
+          <a:p>
+            <a:r>
+              <a:rPr lang="es-HN" dirty="0" smtClean="0"/>
+              <a:t>Anexos</a:t>
+            </a:r>
+            <a:endParaRPr lang="es-HN" dirty="0"/>
+          </a:p>
+        </p:txBody>
+      </p:sp>
+      <p:sp>
+        <p:nvSpPr>
+          <p:cNvPr id="3" name="2 Marcador de texto"/>
+          <p:cNvSpPr>
+            <a:spLocks noGrp="1"/>
+          </p:cNvSpPr>
+          <p:nvPr>
+            <p:ph type="body" idx="1"/>
+          </p:nvPr>
+        </p:nvSpPr>
+        <p:spPr/>
+        <p:txBody>
+          <a:bodyPr/>
+          <a:lstStyle/>
+          <a:p>
+            <a:endParaRPr lang="es-HN"/>
+          </a:p>
+        </p:txBody>
+      </p:sp>
+    </p:spTree>
+  </p:cSld>
+  <p:clrMapOvr>
+    <a:masterClrMapping/>
+  </p:clrMapOvr>
+</p:sld>
+</file>
+
+<file path=ppt/slides/slide15.xml><?xml version="1.0" encoding="utf-8"?>
+<p:sld xmlns:a="http://schemas.openxmlformats.org/drawingml/2006/main" xmlns:r="http://schemas.openxmlformats.org/officeDocument/2006/relationships" xmlns:p="http://schemas.openxmlformats.org/presentationml/2006/main">
+  <p:cSld>
+    <p:spTree>
+      <p:nvGrpSpPr>
+        <p:cNvPr id="1" name=""/>
+        <p:cNvGrpSpPr/>
+        <p:nvPr/>
+      </p:nvGrpSpPr>
+      <p:grpSpPr>
+        <a:xfrm>
+          <a:off x="0" y="0"/>
+          <a:ext cx="0" cy="0"/>
+          <a:chOff x="0" y="0"/>
+          <a:chExt cx="0" cy="0"/>
+        </a:xfrm>
+      </p:grpSpPr>
+      <p:sp>
+        <p:nvSpPr>
+          <p:cNvPr id="4" name="3 Título"/>
+          <p:cNvSpPr>
+            <a:spLocks noGrp="1"/>
+          </p:cNvSpPr>
+          <p:nvPr>
+            <p:ph type="title"/>
+          </p:nvPr>
+        </p:nvSpPr>
+        <p:spPr/>
+        <p:txBody>
+          <a:bodyPr>
+            <a:normAutofit fontScale="90000"/>
+          </a:bodyPr>
+          <a:lstStyle/>
+          <a:p>
+            <a:r>
+              <a:rPr lang="es-HN" dirty="0" smtClean="0"/>
+              <a:t>Componentes de un sistema de recuperación de información</a:t>
+            </a:r>
+            <a:endParaRPr lang="es-HN" dirty="0"/>
+          </a:p>
+        </p:txBody>
+      </p:sp>
+      <p:pic>
+        <p:nvPicPr>
+          <p:cNvPr id="6" name="5 Marcador de contenido" descr="1_IR_Cycle.jpeg"/>
+          <p:cNvPicPr>
+            <a:picLocks noGrp="1" noChangeAspect="1"/>
+          </p:cNvPicPr>
+          <p:nvPr>
+            <p:ph idx="1"/>
+          </p:nvPr>
+        </p:nvPicPr>
+        <p:blipFill>
+          <a:blip r:embed="rId3"/>
+          <a:stretch>
+            <a:fillRect/>
+          </a:stretch>
+        </p:blipFill>
+        <p:spPr>
+          <a:xfrm>
+            <a:off x="1395304" y="1600200"/>
+            <a:ext cx="6353392" cy="4525963"/>
+          </a:xfrm>
+        </p:spPr>
+      </p:pic>
+    </p:spTree>
+  </p:cSld>
+  <p:clrMapOvr>
+    <a:masterClrMapping/>
+  </p:clrMapOvr>
+</p:sld>
+</file>
+
+<file path=ppt/slides/slide16.xml><?xml version="1.0" encoding="utf-8"?>
+<p:sld xmlns:a="http://schemas.openxmlformats.org/drawingml/2006/main" xmlns:r="http://schemas.openxmlformats.org/officeDocument/2006/relationships" xmlns:p="http://schemas.openxmlformats.org/presentationml/2006/main">
+  <p:cSld>
+    <p:spTree>
+      <p:nvGrpSpPr>
+        <p:cNvPr id="1" name=""/>
+        <p:cNvGrpSpPr/>
+        <p:nvPr/>
+      </p:nvGrpSpPr>
+      <p:grpSpPr>
+        <a:xfrm>
+          <a:off x="0" y="0"/>
+          <a:ext cx="0" cy="0"/>
+          <a:chOff x="0" y="0"/>
+          <a:chExt cx="0" cy="0"/>
+        </a:xfrm>
+      </p:grpSpPr>
+      <p:sp>
+        <p:nvSpPr>
+          <p:cNvPr id="4" name="3 Título"/>
+          <p:cNvSpPr>
+            <a:spLocks noGrp="1"/>
+          </p:cNvSpPr>
+          <p:nvPr>
+            <p:ph type="title"/>
+          </p:nvPr>
+        </p:nvSpPr>
+        <p:spPr/>
+        <p:txBody>
+          <a:bodyPr>
+            <a:normAutofit fontScale="90000"/>
+          </a:bodyPr>
+          <a:lstStyle/>
+          <a:p>
+            <a:r>
+              <a:rPr lang="es-HN" dirty="0" smtClean="0"/>
+              <a:t>Taxonomía de sistemas de recuperación de información</a:t>
+            </a:r>
+            <a:endParaRPr lang="es-HN" dirty="0"/>
+          </a:p>
+        </p:txBody>
+      </p:sp>
+      <p:pic>
+        <p:nvPicPr>
+          <p:cNvPr id="6" name="5 Marcador de contenido" descr="5_IR_taxonomy.jpeg"/>
+          <p:cNvPicPr>
+            <a:picLocks noGrp="1" noChangeAspect="1"/>
+          </p:cNvPicPr>
+          <p:nvPr>
+            <p:ph idx="1"/>
+          </p:nvPr>
+        </p:nvPicPr>
+        <p:blipFill>
+          <a:blip r:embed="rId2"/>
+          <a:stretch>
+            <a:fillRect/>
+          </a:stretch>
+        </p:blipFill>
+        <p:spPr>
+          <a:xfrm>
+            <a:off x="1071538" y="1928802"/>
+            <a:ext cx="6756559" cy="3077380"/>
+          </a:xfrm>
+        </p:spPr>
+      </p:pic>
+    </p:spTree>
+  </p:cSld>
+  <p:clrMapOvr>
+    <a:masterClrMapping/>
+  </p:clrMapOvr>
+</p:sld>
+</file>
+
+<file path=ppt/slides/slide17.xml><?xml version="1.0" encoding="utf-8"?>
+<p:sld xmlns:a="http://schemas.openxmlformats.org/drawingml/2006/main" xmlns:r="http://schemas.openxmlformats.org/officeDocument/2006/relationships" xmlns:p="http://schemas.openxmlformats.org/presentationml/2006/main">
+  <p:cSld>
+    <p:spTree>
+      <p:nvGrpSpPr>
+        <p:cNvPr id="1" name=""/>
+        <p:cNvGrpSpPr/>
+        <p:nvPr/>
+      </p:nvGrpSpPr>
+      <p:grpSpPr>
+        <a:xfrm>
+          <a:off x="0" y="0"/>
+          <a:ext cx="0" cy="0"/>
+          <a:chOff x="0" y="0"/>
+          <a:chExt cx="0" cy="0"/>
+        </a:xfrm>
+      </p:grpSpPr>
+      <p:sp>
+        <p:nvSpPr>
+          <p:cNvPr id="2" name="1 Título"/>
+          <p:cNvSpPr>
+            <a:spLocks noGrp="1"/>
+          </p:cNvSpPr>
+          <p:nvPr>
+            <p:ph type="title"/>
+          </p:nvPr>
+        </p:nvSpPr>
+        <p:spPr/>
+        <p:txBody>
+          <a:bodyPr/>
+          <a:lstStyle/>
+          <a:p>
+            <a:r>
+              <a:rPr lang="es-HN" dirty="0" smtClean="0"/>
+              <a:t>Prototipo de la interfaz</a:t>
+            </a:r>
+            <a:endParaRPr lang="es-HN" dirty="0"/>
+          </a:p>
+        </p:txBody>
+      </p:sp>
+      <p:pic>
+        <p:nvPicPr>
+          <p:cNvPr id="4" name="3 Marcador de contenido" descr="10_Home.png"/>
+          <p:cNvPicPr>
+            <a:picLocks noGrp="1" noChangeAspect="1"/>
+          </p:cNvPicPr>
+          <p:nvPr>
+            <p:ph idx="1"/>
+          </p:nvPr>
+        </p:nvPicPr>
+        <p:blipFill>
+          <a:blip r:embed="rId2"/>
+          <a:stretch>
+            <a:fillRect/>
+          </a:stretch>
+        </p:blipFill>
+        <p:spPr>
+          <a:xfrm>
+            <a:off x="800364" y="1600200"/>
+            <a:ext cx="7543272" cy="4525963"/>
+          </a:xfrm>
+        </p:spPr>
+      </p:pic>
+    </p:spTree>
+  </p:cSld>
+  <p:clrMapOvr>
+    <a:masterClrMapping/>
+  </p:clrMapOvr>
+  <p:timing>
+    <p:tnLst>
+      <p:par>
+        <p:cTn id="1" dur="indefinite" restart="never" nodeType="tmRoot"/>
+      </p:par>
+    </p:tnLst>
+  </p:timing>
+</p:sld>
+</file>
+
 <file path=ppt/slides/slide2.xml><?xml version="1.0" encoding="utf-8"?>
 <p:sld xmlns:a="http://schemas.openxmlformats.org/drawingml/2006/main" xmlns:r="http://schemas.openxmlformats.org/officeDocument/2006/relationships" xmlns:p="http://schemas.openxmlformats.org/presentationml/2006/main">
   <p:cSld>
@@ -3165,12 +4178,12 @@
               <a:buNone/>
             </a:pPr>
             <a:r>
-              <a:rPr lang="es-HN" smtClean="0"/>
-              <a:t>	Implementar </a:t>
-            </a:r>
-            <a:r>
-              <a:rPr lang="es-HN" dirty="0" smtClean="0"/>
-              <a:t>un sistema que ayude a la planificación de actividades académicas mediante la recomendación proactiva de documentos que puedan servir como recursos de apoyo</a:t>
+              <a:rPr lang="es-HN" dirty="0" smtClean="0"/>
+              <a:t>	Implementar un sistema que ayude a la planificación de actividades académicas mediante la recomendación proactiva de documentos que puedan servir como recursos de </a:t>
+            </a:r>
+            <a:r>
+              <a:rPr lang="es-HN" dirty="0" smtClean="0"/>
+              <a:t>apoyo.</a:t>
             </a:r>
             <a:endParaRPr lang="es-HN" dirty="0"/>
           </a:p>
@@ -3203,7 +4216,7 @@
       </p:grpSpPr>
       <p:sp>
         <p:nvSpPr>
-          <p:cNvPr id="4" name="3 Título"/>
+          <p:cNvPr id="2" name="1 Título"/>
           <p:cNvSpPr>
             <a:spLocks noGrp="1"/>
           </p:cNvSpPr>
@@ -3218,7 +4231,7 @@
           <a:p>
             <a:r>
               <a:rPr lang="es-HN" dirty="0" smtClean="0"/>
-              <a:t>Marco teórico</a:t>
+              <a:t>¿Cómo hacerlo?</a:t>
             </a:r>
             <a:endParaRPr lang="es-HN" dirty="0"/>
           </a:p>
@@ -3226,20 +4239,54 @@
       </p:sp>
       <p:sp>
         <p:nvSpPr>
-          <p:cNvPr id="5" name="4 Marcador de texto"/>
-          <p:cNvSpPr>
-            <a:spLocks noGrp="1"/>
-          </p:cNvSpPr>
-          <p:nvPr>
-            <p:ph type="body" idx="1"/>
-          </p:nvPr>
-        </p:nvSpPr>
-        <p:spPr/>
-        <p:txBody>
-          <a:bodyPr/>
-          <a:lstStyle/>
-          <a:p>
-            <a:endParaRPr lang="es-HN"/>
+          <p:cNvPr id="3" name="2 Marcador de contenido"/>
+          <p:cNvSpPr>
+            <a:spLocks noGrp="1"/>
+          </p:cNvSpPr>
+          <p:nvPr>
+            <p:ph idx="1"/>
+          </p:nvPr>
+        </p:nvSpPr>
+        <p:spPr/>
+        <p:txBody>
+          <a:bodyPr/>
+          <a:lstStyle/>
+          <a:p>
+            <a:r>
+              <a:rPr lang="es-HN" dirty="0" smtClean="0"/>
+              <a:t>¿De dónde sacar la información?</a:t>
+            </a:r>
+          </a:p>
+          <a:p>
+            <a:pPr lvl="1"/>
+            <a:r>
+              <a:rPr lang="es-HN" dirty="0" smtClean="0"/>
+              <a:t>¿Y cómo obtener esa información?</a:t>
+            </a:r>
+          </a:p>
+          <a:p>
+            <a:r>
+              <a:rPr lang="es-HN" dirty="0" smtClean="0"/>
+              <a:t>¿Cómo saber que está relacionado a la tarea del usuario?</a:t>
+            </a:r>
+          </a:p>
+          <a:p>
+            <a:pPr lvl="1"/>
+            <a:r>
+              <a:rPr lang="es-HN" dirty="0" smtClean="0"/>
+              <a:t>¿Cómo definimos la tarea del usuario?</a:t>
+            </a:r>
+          </a:p>
+          <a:p>
+            <a:pPr lvl="1"/>
+            <a:r>
+              <a:rPr lang="es-HN" dirty="0" smtClean="0"/>
+              <a:t>¿Nos sirve saber algo de antemano?</a:t>
+            </a:r>
+            <a:endParaRPr lang="es-HN" dirty="0" smtClean="0"/>
+          </a:p>
+          <a:p>
+            <a:endParaRPr lang="es-HN" dirty="0" smtClean="0"/>
           </a:p>
         </p:txBody>
       </p:sp>
@@ -3270,7 +4317,7 @@
       </p:grpSpPr>
       <p:sp>
         <p:nvSpPr>
-          <p:cNvPr id="4" name="3 Título"/>
+          <p:cNvPr id="2" name="1 Título"/>
           <p:cNvSpPr>
             <a:spLocks noGrp="1"/>
           </p:cNvSpPr>
@@ -3287,7 +4334,11 @@
           <a:p>
             <a:r>
               <a:rPr lang="es-HN" dirty="0" smtClean="0"/>
-              <a:t>Recuperación oportuna de la información</a:t>
+              <a:t>Marco teórico: Recuperación </a:t>
+            </a:r>
+            <a:r>
+              <a:rPr lang="es-HN" dirty="0" smtClean="0"/>
+              <a:t>de la información</a:t>
             </a:r>
             <a:endParaRPr lang="es-HN" dirty="0"/>
           </a:p>
@@ -3295,7 +4346,7 @@
       </p:sp>
       <p:sp>
         <p:nvSpPr>
-          <p:cNvPr id="5" name="4 Marcador de contenido"/>
+          <p:cNvPr id="3" name="2 Marcador de contenido"/>
           <p:cNvSpPr>
             <a:spLocks noGrp="1"/>
           </p:cNvSpPr>
@@ -3310,41 +4361,39 @@
           <a:p>
             <a:r>
               <a:rPr lang="es-HN" dirty="0" smtClean="0"/>
-              <a:t>Obtener información </a:t>
+              <a:t>Satisface una necesidad </a:t>
             </a:r>
             <a:r>
               <a:rPr lang="es-HN" i="1" dirty="0" smtClean="0"/>
-              <a:t>útil</a:t>
-            </a:r>
-            <a:r>
-              <a:rPr lang="es-HN" dirty="0" smtClean="0"/>
-              <a:t> en base al contexto local del usuario.</a:t>
-            </a:r>
-          </a:p>
-          <a:p>
-            <a:r>
-              <a:rPr lang="es-HN" dirty="0" smtClean="0"/>
-              <a:t>Trata de maximizar la ganancia y la </a:t>
-            </a:r>
-            <a:r>
-              <a:rPr lang="es-HN" i="1" dirty="0" err="1" smtClean="0"/>
-              <a:t>serendipia</a:t>
-            </a:r>
-            <a:r>
-              <a:rPr lang="es-HN" i="1" dirty="0" smtClean="0"/>
-              <a:t>: </a:t>
-            </a:r>
-            <a:r>
-              <a:rPr lang="es-HN" dirty="0" smtClean="0"/>
-              <a:t>los documentos más útiles son a veces los menos obvios</a:t>
-            </a:r>
-            <a:endParaRPr lang="es-HN" i="1" dirty="0" smtClean="0"/>
-          </a:p>
-          <a:p>
-            <a:r>
-              <a:rPr lang="es-HN" dirty="0" smtClean="0"/>
-              <a:t>Se enfoca en la utilidad, que trasciende a la relevancia.</a:t>
-            </a:r>
+              <a:t>explícita</a:t>
+            </a:r>
+            <a:r>
+              <a:rPr lang="es-HN" dirty="0" smtClean="0"/>
+              <a:t> de información expresada en una consulta.</a:t>
+            </a:r>
+          </a:p>
+          <a:p>
+            <a:r>
+              <a:rPr lang="es-HN" dirty="0" smtClean="0"/>
+              <a:t>Se centra en la relevancia.</a:t>
+            </a:r>
+          </a:p>
+          <a:p>
+            <a:r>
+              <a:rPr lang="es-HN" dirty="0" smtClean="0"/>
+              <a:t>Espera que el usuario revise los resultados y refine la consulta</a:t>
+            </a:r>
+            <a:r>
+              <a:rPr lang="es-HN" dirty="0" smtClean="0"/>
+              <a:t>.</a:t>
+            </a:r>
+          </a:p>
+          <a:p>
+            <a:r>
+              <a:rPr lang="es-HN" dirty="0" smtClean="0"/>
+              <a:t>¿Los enfoques orientados a conceptos, servirían?</a:t>
+            </a:r>
+            <a:endParaRPr lang="es-HN" dirty="0"/>
           </a:p>
         </p:txBody>
       </p:sp>
@@ -3385,12 +4434,26 @@
         </p:nvSpPr>
         <p:spPr/>
         <p:txBody>
-          <a:bodyPr/>
-          <a:lstStyle/>
-          <a:p>
-            <a:r>
-              <a:rPr lang="es-HN" dirty="0" smtClean="0"/>
-              <a:t>Recuperación de la información</a:t>
+          <a:bodyPr>
+            <a:normAutofit fontScale="90000"/>
+          </a:bodyPr>
+          <a:lstStyle/>
+          <a:p>
+            <a:r>
+              <a:rPr lang="es-HN" dirty="0" smtClean="0"/>
+              <a:t>Marco teórico: </a:t>
+            </a:r>
+            <a:r>
+              <a:rPr lang="es-HN" dirty="0" smtClean="0"/>
+              <a:t>Sistemas </a:t>
+            </a:r>
+            <a:r>
+              <a:rPr lang="es-HN" dirty="0" smtClean="0"/>
+              <a:t>de </a:t>
+            </a:r>
+            <a:r>
+              <a:rPr lang="es-HN" dirty="0" smtClean="0"/>
+              <a:t>recomendación en general</a:t>
             </a:r>
             <a:endParaRPr lang="es-HN" dirty="0"/>
           </a:p>
@@ -3413,28 +4476,55 @@
           <a:p>
             <a:r>
               <a:rPr lang="es-HN" dirty="0" smtClean="0"/>
-              <a:t>Satisface una necesidad </a:t>
+              <a:t>Se basan en </a:t>
+            </a:r>
+            <a:r>
+              <a:rPr lang="es-HN" dirty="0" smtClean="0"/>
+              <a:t>un artículo que ya conocen y que el usuario está manipulando.</a:t>
+            </a:r>
+          </a:p>
+          <a:p>
+            <a:r>
+              <a:rPr lang="es-HN" dirty="0" smtClean="0"/>
+              <a:t>Filtran los artículos existentes</a:t>
+            </a:r>
+            <a:endParaRPr lang="es-HN" dirty="0" smtClean="0"/>
+          </a:p>
+          <a:p>
+            <a:pPr lvl="1"/>
+            <a:r>
+              <a:rPr lang="es-HN" dirty="0" smtClean="0"/>
+              <a:t>Pueden partir del perfil del usuario y el contenido.</a:t>
+            </a:r>
+          </a:p>
+          <a:p>
+            <a:pPr lvl="1"/>
+            <a:r>
+              <a:rPr lang="es-HN" dirty="0" smtClean="0"/>
+              <a:t>O de la inteligencia colectiva</a:t>
+            </a:r>
+            <a:r>
+              <a:rPr lang="es-HN" dirty="0" smtClean="0"/>
+              <a:t>.</a:t>
+            </a:r>
+          </a:p>
+          <a:p>
+            <a:pPr lvl="1"/>
+            <a:r>
+              <a:rPr lang="es-HN" dirty="0" smtClean="0"/>
+              <a:t>En todo caso, necesitan una etapa de </a:t>
             </a:r>
             <a:r>
               <a:rPr lang="es-HN" i="1" dirty="0" smtClean="0"/>
-              <a:t>explícita</a:t>
-            </a:r>
-            <a:r>
-              <a:rPr lang="es-HN" dirty="0" smtClean="0"/>
-              <a:t> de información expresada en una consulta.</a:t>
-            </a:r>
-          </a:p>
-          <a:p>
-            <a:r>
-              <a:rPr lang="es-HN" dirty="0" smtClean="0"/>
-              <a:t>Se centra en la relevancia.</a:t>
-            </a:r>
-          </a:p>
-          <a:p>
-            <a:r>
-              <a:rPr lang="es-HN" dirty="0" smtClean="0"/>
-              <a:t>Espera que el usuario revise los resultados y refine la consulta.</a:t>
-            </a:r>
+              <a:t>aprendizaje</a:t>
+            </a:r>
+            <a:r>
+              <a:rPr lang="es-HN" dirty="0" smtClean="0"/>
+              <a:t> antes de ser efectivos.</a:t>
+            </a:r>
+            <a:endParaRPr lang="es-HN" dirty="0" smtClean="0"/>
+          </a:p>
+          <a:p>
             <a:endParaRPr lang="es-HN" dirty="0"/>
           </a:p>
         </p:txBody>
@@ -3481,7 +4571,7 @@
           <a:p>
             <a:r>
               <a:rPr lang="es-HN" dirty="0" smtClean="0"/>
-              <a:t>Sistemas de recomendación</a:t>
+              <a:t>Marco teórico: agentes inteligentes</a:t>
             </a:r>
             <a:endParaRPr lang="es-HN" dirty="0"/>
           </a:p>
@@ -3504,30 +4594,30 @@
           <a:p>
             <a:r>
               <a:rPr lang="es-HN" dirty="0" smtClean="0"/>
-              <a:t>Se basan en una necesidad </a:t>
+              <a:t>¿Cómo puede la máquina utilizar lo que ya sabe para filtrar información?</a:t>
+            </a:r>
+          </a:p>
+          <a:p>
+            <a:pPr lvl="1"/>
+            <a:r>
+              <a:rPr lang="es-HN" dirty="0" smtClean="0"/>
+              <a:t>Aprendizaje de máquina: crea hipótesis de cómo funciona el mundo en base a su experiencia.</a:t>
+            </a:r>
+          </a:p>
+          <a:p>
+            <a:pPr lvl="1"/>
+            <a:r>
+              <a:rPr lang="es-HN" dirty="0" smtClean="0"/>
+              <a:t>Redes neuronales, inferencia bayesiana, árboles de decisión… En todo caso se debe tratar de encontrar </a:t>
             </a:r>
             <a:r>
               <a:rPr lang="es-HN" i="1" dirty="0" smtClean="0"/>
-              <a:t>implícita</a:t>
-            </a:r>
-            <a:r>
-              <a:rPr lang="es-HN" dirty="0" smtClean="0"/>
-              <a:t> de información.</a:t>
-            </a:r>
-          </a:p>
-          <a:p>
-            <a:r>
-              <a:rPr lang="es-HN" dirty="0" smtClean="0"/>
-              <a:t>Pueden partir del perfil del usuario y el contenido.</a:t>
-            </a:r>
-          </a:p>
-          <a:p>
-            <a:r>
-              <a:rPr lang="es-HN" dirty="0" smtClean="0"/>
-              <a:t>O de la inteligencia colectiva.</a:t>
-            </a:r>
-          </a:p>
-          <a:p>
+              <a:t>qué</a:t>
+            </a:r>
+            <a:r>
+              <a:rPr lang="es-HN" dirty="0" smtClean="0"/>
+              <a:t> define a un curso.</a:t>
+            </a:r>
             <a:endParaRPr lang="es-HN" dirty="0"/>
           </a:p>
         </p:txBody>
@@ -3559,7 +4649,7 @@
       </p:grpSpPr>
       <p:sp>
         <p:nvSpPr>
-          <p:cNvPr id="2" name="1 Título"/>
+          <p:cNvPr id="4" name="3 Título"/>
           <p:cNvSpPr>
             <a:spLocks noGrp="1"/>
           </p:cNvSpPr>
@@ -3576,7 +4666,11 @@
           <a:p>
             <a:r>
               <a:rPr lang="es-HN" dirty="0" smtClean="0"/>
-              <a:t>Observaciones sobre la implementación</a:t>
+              <a:t>Marco teórico: Recuperación </a:t>
+            </a:r>
+            <a:r>
+              <a:rPr lang="es-HN" dirty="0" smtClean="0"/>
+              <a:t>oportuna de la información</a:t>
             </a:r>
             <a:endParaRPr lang="es-HN" dirty="0"/>
           </a:p>
@@ -3584,7 +4678,7 @@
       </p:sp>
       <p:sp>
         <p:nvSpPr>
-          <p:cNvPr id="3" name="2 Marcador de contenido"/>
+          <p:cNvPr id="5" name="4 Marcador de contenido"/>
           <p:cNvSpPr>
             <a:spLocks noGrp="1"/>
           </p:cNvSpPr>
@@ -3599,22 +4693,56 @@
           <a:p>
             <a:r>
               <a:rPr lang="es-HN" dirty="0" smtClean="0"/>
-              <a:t>La educación es social, no individual.</a:t>
-            </a:r>
-          </a:p>
-          <a:p>
-            <a:r>
-              <a:rPr lang="es-HN" dirty="0" smtClean="0"/>
-              <a:t>Los documentos más útiles son los que el usuario no ha buscado aún: se beneficiaría de una búsqueda orientada a </a:t>
+              <a:t>Obtener información </a:t>
             </a:r>
             <a:r>
               <a:rPr lang="es-HN" i="1" dirty="0" smtClean="0"/>
-              <a:t>conceptos</a:t>
-            </a:r>
-            <a:r>
-              <a:rPr lang="es-HN" dirty="0" smtClean="0"/>
-              <a:t> y no solo palabras clave.</a:t>
-            </a:r>
+              <a:t>útil</a:t>
+            </a:r>
+            <a:r>
+              <a:rPr lang="es-HN" dirty="0" smtClean="0"/>
+              <a:t> en base al contexto local del usuario</a:t>
+            </a:r>
+            <a:r>
+              <a:rPr lang="es-HN" dirty="0" smtClean="0"/>
+              <a:t>.</a:t>
+            </a:r>
+            <a:endParaRPr lang="es-HN" dirty="0" smtClean="0"/>
+          </a:p>
+          <a:p>
+            <a:r>
+              <a:rPr lang="es-HN" dirty="0" smtClean="0"/>
+              <a:t>Trata de maximizar la ganancia y la </a:t>
+            </a:r>
+            <a:r>
+              <a:rPr lang="es-HN" i="1" dirty="0" err="1" smtClean="0"/>
+              <a:t>serendipia</a:t>
+            </a:r>
+            <a:r>
+              <a:rPr lang="es-HN" i="1" dirty="0" smtClean="0"/>
+              <a:t>: </a:t>
+            </a:r>
+            <a:r>
+              <a:rPr lang="es-HN" dirty="0" smtClean="0"/>
+              <a:t>los documentos más útiles son a veces los menos obvios</a:t>
+            </a:r>
+            <a:endParaRPr lang="es-HN" i="1" dirty="0" smtClean="0"/>
+          </a:p>
+          <a:p>
+            <a:r>
+              <a:rPr lang="es-HN" dirty="0" smtClean="0"/>
+              <a:t>Se enfoca en la utilidad, que trasciende a la relevancia</a:t>
+            </a:r>
+            <a:r>
+              <a:rPr lang="es-HN" dirty="0" smtClean="0"/>
+              <a:t>.</a:t>
+            </a:r>
+          </a:p>
+          <a:p>
+            <a:pPr>
+              <a:buNone/>
+            </a:pPr>
+            <a:endParaRPr lang="es-HN" dirty="0" smtClean="0"/>
           </a:p>
         </p:txBody>
       </p:sp>
@@ -3655,12 +4783,14 @@
         </p:nvSpPr>
         <p:spPr/>
         <p:txBody>
-          <a:bodyPr/>
-          <a:lstStyle/>
-          <a:p>
-            <a:r>
-              <a:rPr lang="es-HN" dirty="0" smtClean="0"/>
-              <a:t>Arquitectura</a:t>
+          <a:bodyPr>
+            <a:normAutofit/>
+          </a:bodyPr>
+          <a:lstStyle/>
+          <a:p>
+            <a:r>
+              <a:rPr lang="es-HN" dirty="0" smtClean="0"/>
+              <a:t>El contexto académico</a:t>
             </a:r>
             <a:endParaRPr lang="es-HN" dirty="0"/>
           </a:p>
@@ -3683,13 +4813,122 @@
           <a:p>
             <a:r>
               <a:rPr lang="es-HN" dirty="0" smtClean="0"/>
-              <a:t>Un componente de recuperación de información que encuentre documentos afines a los tópicos del contexto.</a:t>
-            </a:r>
-          </a:p>
-          <a:p>
-            <a:r>
-              <a:rPr lang="es-HN" dirty="0" smtClean="0"/>
-              <a:t>Un componente de filtrado que tenga en cuenta el historial individual y la inteligencia colectiva.</a:t>
+              <a:t>La educación es social, no individual.</a:t>
+            </a:r>
+          </a:p>
+          <a:p>
+            <a:r>
+              <a:rPr lang="es-HN" dirty="0" smtClean="0"/>
+              <a:t>Los documentos más útiles son los que el usuario no ha buscado aún: se beneficiaría de una búsqueda orientada a </a:t>
+            </a:r>
+            <a:r>
+              <a:rPr lang="es-HN" i="1" dirty="0" smtClean="0"/>
+              <a:t>conceptos</a:t>
+            </a:r>
+            <a:r>
+              <a:rPr lang="es-HN" dirty="0" smtClean="0"/>
+              <a:t> y no solo palabras clave</a:t>
+            </a:r>
+            <a:r>
+              <a:rPr lang="es-HN" dirty="0" smtClean="0"/>
+              <a:t>.</a:t>
+            </a:r>
+          </a:p>
+          <a:p>
+            <a:r>
+              <a:rPr lang="es-HN" dirty="0" smtClean="0"/>
+              <a:t>Se puede saber algo del curso, con este conocimiento los resultados se pueden </a:t>
+            </a:r>
+            <a:r>
+              <a:rPr lang="es-HN" i="1" dirty="0" smtClean="0"/>
+              <a:t>filtrar</a:t>
+            </a:r>
+            <a:r>
+              <a:rPr lang="es-HN" dirty="0" smtClean="0"/>
+              <a:t>.</a:t>
+            </a:r>
+            <a:endParaRPr lang="es-HN" dirty="0" smtClean="0"/>
+          </a:p>
+        </p:txBody>
+      </p:sp>
+    </p:spTree>
+  </p:cSld>
+  <p:clrMapOvr>
+    <a:masterClrMapping/>
+  </p:clrMapOvr>
+</p:sld>
+</file>
+
+<file path=ppt/slides/slide9.xml><?xml version="1.0" encoding="utf-8"?>
+<p:sld xmlns:a="http://schemas.openxmlformats.org/drawingml/2006/main" xmlns:r="http://schemas.openxmlformats.org/officeDocument/2006/relationships" xmlns:p="http://schemas.openxmlformats.org/presentationml/2006/main">
+  <p:cSld>
+    <p:spTree>
+      <p:nvGrpSpPr>
+        <p:cNvPr id="1" name=""/>
+        <p:cNvGrpSpPr/>
+        <p:nvPr/>
+      </p:nvGrpSpPr>
+      <p:grpSpPr>
+        <a:xfrm>
+          <a:off x="0" y="0"/>
+          <a:ext cx="0" cy="0"/>
+          <a:chOff x="0" y="0"/>
+          <a:chExt cx="0" cy="0"/>
+        </a:xfrm>
+      </p:grpSpPr>
+      <p:sp>
+        <p:nvSpPr>
+          <p:cNvPr id="2" name="1 Título"/>
+          <p:cNvSpPr>
+            <a:spLocks noGrp="1"/>
+          </p:cNvSpPr>
+          <p:nvPr>
+            <p:ph type="title"/>
+          </p:nvPr>
+        </p:nvSpPr>
+        <p:spPr/>
+        <p:txBody>
+          <a:bodyPr/>
+          <a:lstStyle/>
+          <a:p>
+            <a:r>
+              <a:rPr lang="es-HN" dirty="0" smtClean="0"/>
+              <a:t>La solución: qué hacer</a:t>
+            </a:r>
+            <a:endParaRPr lang="es-HN" dirty="0"/>
+          </a:p>
+        </p:txBody>
+      </p:sp>
+      <p:sp>
+        <p:nvSpPr>
+          <p:cNvPr id="3" name="2 Marcador de contenido"/>
+          <p:cNvSpPr>
+            <a:spLocks noGrp="1"/>
+          </p:cNvSpPr>
+          <p:nvPr>
+            <p:ph idx="1"/>
+          </p:nvPr>
+        </p:nvSpPr>
+        <p:spPr/>
+        <p:txBody>
+          <a:bodyPr/>
+          <a:lstStyle/>
+          <a:p>
+            <a:r>
+              <a:rPr lang="es-HN" dirty="0" smtClean="0"/>
+              <a:t>Recopilar información del curso en el que se planifica.</a:t>
+            </a:r>
+          </a:p>
+          <a:p>
+            <a:r>
+              <a:rPr lang="es-HN" dirty="0" smtClean="0"/>
+              <a:t>Buscar documentos y considerar la relevancia/utilidad en base a la tarea actual y a lo que ya se sabe del curso.</a:t>
+            </a:r>
+          </a:p>
+          <a:p>
+            <a:r>
+              <a:rPr lang="es-HN" dirty="0" smtClean="0"/>
+              <a:t>Hacerlo de manera que no interrumpa la tarea principal.</a:t>
             </a:r>
             <a:endParaRPr lang="es-HN" dirty="0"/>
           </a:p>
@@ -3984,4 +5223,287 @@
   <a:objectDefaults/>
   <a:extraClrSchemeLst/>
 </a:theme>
+</file>
+
+<file path=ppt/theme/theme2.xml><?xml version="1.0" encoding="utf-8"?>
+<a:theme xmlns:a="http://schemas.openxmlformats.org/drawingml/2006/main" name="Tema de Office">
+  <a:themeElements>
+    <a:clrScheme name="Office">
+      <a:dk1>
+        <a:sysClr val="windowText" lastClr="000000"/>
+      </a:dk1>
+      <a:lt1>
+        <a:sysClr val="window" lastClr="FFFFFF"/>
+      </a:lt1>
+      <a:dk2>
+        <a:srgbClr val="1F497D"/>
+      </a:dk2>
+      <a:lt2>
+        <a:srgbClr val="EEECE1"/>
+      </a:lt2>
+      <a:accent1>
+        <a:srgbClr val="4F81BD"/>
+      </a:accent1>
+      <a:accent2>
+        <a:srgbClr val="C0504D"/>
+      </a:accent2>
+      <a:accent3>
+        <a:srgbClr val="9BBB59"/>
+      </a:accent3>
+      <a:accent4>
+        <a:srgbClr val="8064A2"/>
+      </a:accent4>
+      <a:accent5>
+        <a:srgbClr val="4BACC6"/>
+      </a:accent5>
+      <a:accent6>
+        <a:srgbClr val="F79646"/>
+      </a:accent6>
+      <a:hlink>
+        <a:srgbClr val="0000FF"/>
+      </a:hlink>
+      <a:folHlink>
+        <a:srgbClr val="800080"/>
+      </a:folHlink>
+    </a:clrScheme>
+    <a:fontScheme name="Office">
+      <a:majorFont>
+        <a:latin typeface="Calibri"/>
+        <a:ea typeface=""/>
+        <a:cs typeface=""/>
+        <a:font script="Jpan" typeface="ＭＳ Ｐゴシック"/>
+        <a:font script="Hang" typeface="맑은 고딕"/>
+        <a:font script="Hans" typeface="宋体"/>
+        <a:font script="Hant" typeface="新細明體"/>
+        <a:font script="Arab" typeface="Times New Roman"/>
+        <a:font script="Hebr" typeface="Times New Roman"/>
+        <a:font script="Thai" typeface="Angsana New"/>
+        <a:font script="Ethi" typeface="Nyala"/>
+        <a:font script="Beng" typeface="Vrinda"/>
+        <a:font script="Gujr" typeface="Shruti"/>
+        <a:font script="Khmr" typeface="MoolBoran"/>
+        <a:font script="Knda" typeface="Tunga"/>
+        <a:font script="Guru" typeface="Raavi"/>
+        <a:font script="Cans" typeface="Euphemia"/>
+        <a:font script="Cher" typeface="Plantagenet Cherokee"/>
+        <a:font script="Yiii" typeface="Microsoft Yi Baiti"/>
+        <a:font script="Tibt" typeface="Microsoft Himalaya"/>
+        <a:font script="Thaa" typeface="MV Boli"/>
+        <a:font script="Deva" typeface="Mangal"/>
+        <a:font script="Telu" typeface="Gautami"/>
+        <a:font script="Taml" typeface="Latha"/>
+        <a:font script="Syrc" typeface="Estrangelo Edessa"/>
+        <a:font script="Orya" typeface="Kalinga"/>
+        <a:font script="Mlym" typeface="Kartika"/>
+        <a:font script="Laoo" typeface="DokChampa"/>
+        <a:font script="Sinh" typeface="Iskoola Pota"/>
+        <a:font script="Mong" typeface="Mongolian Baiti"/>
+        <a:font script="Viet" typeface="Times New Roman"/>
+        <a:font script="Uigh" typeface="Microsoft Uighur"/>
+      </a:majorFont>
+      <a:minorFont>
+        <a:latin typeface="Calibri"/>
+        <a:ea typeface=""/>
+        <a:cs typeface=""/>
+        <a:font script="Jpan" typeface="ＭＳ Ｐゴシック"/>
+        <a:font script="Hang" typeface="맑은 고딕"/>
+        <a:font script="Hans" typeface="宋体"/>
+        <a:font script="Hant" typeface="新細明體"/>
+        <a:font script="Arab" typeface="Arial"/>
+        <a:font script="Hebr" typeface="Arial"/>
+        <a:font script="Thai" typeface="Cordia New"/>
+        <a:font script="Ethi" typeface="Nyala"/>
+        <a:font script="Beng" typeface="Vrinda"/>
+        <a:font script="Gujr" typeface="Shruti"/>
+        <a:font script="Khmr" typeface="DaunPenh"/>
+        <a:font script="Knda" typeface="Tunga"/>
+        <a:font script="Guru" typeface="Raavi"/>
+        <a:font script="Cans" typeface="Euphemia"/>
+        <a:font script="Cher" typeface="Plantagenet Cherokee"/>
+        <a:font script="Yiii" typeface="Microsoft Yi Baiti"/>
+        <a:font script="Tibt" typeface="Microsoft Himalaya"/>
+        <a:font script="Thaa" typeface="MV Boli"/>
+        <a:font script="Deva" typeface="Mangal"/>
+        <a:font script="Telu" typeface="Gautami"/>
+        <a:font script="Taml" typeface="Latha"/>
+        <a:font script="Syrc" typeface="Estrangelo Edessa"/>
+        <a:font script="Orya" typeface="Kalinga"/>
+        <a:font script="Mlym" typeface="Kartika"/>
+        <a:font script="Laoo" typeface="DokChampa"/>
+        <a:font script="Sinh" typeface="Iskoola Pota"/>
+        <a:font script="Mong" typeface="Mongolian Baiti"/>
+        <a:font script="Viet" typeface="Arial"/>
+        <a:font script="Uigh" typeface="Microsoft Uighur"/>
+      </a:minorFont>
+    </a:fontScheme>
+    <a:fmtScheme name="Office">
+      <a:fillStyleLst>
+        <a:solidFill>
+          <a:schemeClr val="phClr"/>
+        </a:solidFill>
+        <a:gradFill rotWithShape="1">
+          <a:gsLst>
+            <a:gs pos="0">
+              <a:schemeClr val="phClr">
+                <a:tint val="50000"/>
+                <a:satMod val="300000"/>
+              </a:schemeClr>
+            </a:gs>
+            <a:gs pos="35000">
+              <a:schemeClr val="phClr">
+                <a:tint val="37000"/>
+                <a:satMod val="300000"/>
+              </a:schemeClr>
+            </a:gs>
+            <a:gs pos="100000">
+              <a:schemeClr val="phClr">
+                <a:tint val="15000"/>
+                <a:satMod val="350000"/>
+              </a:schemeClr>
+            </a:gs>
+          </a:gsLst>
+          <a:lin ang="16200000" scaled="1"/>
+        </a:gradFill>
+        <a:gradFill rotWithShape="1">
+          <a:gsLst>
+            <a:gs pos="0">
+              <a:schemeClr val="phClr">
+                <a:shade val="51000"/>
+                <a:satMod val="130000"/>
+              </a:schemeClr>
+            </a:gs>
+            <a:gs pos="80000">
+              <a:schemeClr val="phClr">
+                <a:shade val="93000"/>
+                <a:satMod val="130000"/>
+              </a:schemeClr>
+            </a:gs>
+            <a:gs pos="100000">
+              <a:schemeClr val="phClr">
+                <a:shade val="94000"/>
+                <a:satMod val="135000"/>
+              </a:schemeClr>
+            </a:gs>
+          </a:gsLst>
+          <a:lin ang="16200000" scaled="0"/>
+        </a:gradFill>
+      </a:fillStyleLst>
+      <a:lnStyleLst>
+        <a:ln w="9525" cap="flat" cmpd="sng" algn="ctr">
+          <a:solidFill>
+            <a:schemeClr val="phClr">
+              <a:shade val="95000"/>
+              <a:satMod val="105000"/>
+            </a:schemeClr>
+          </a:solidFill>
+          <a:prstDash val="solid"/>
+        </a:ln>
+        <a:ln w="25400" cap="flat" cmpd="sng" algn="ctr">
+          <a:solidFill>
+            <a:schemeClr val="phClr"/>
+          </a:solidFill>
+          <a:prstDash val="solid"/>
+        </a:ln>
+        <a:ln w="38100" cap="flat" cmpd="sng" algn="ctr">
+          <a:solidFill>
+            <a:schemeClr val="phClr"/>
+          </a:solidFill>
+          <a:prstDash val="solid"/>
+        </a:ln>
+      </a:lnStyleLst>
+      <a:effectStyleLst>
+        <a:effectStyle>
+          <a:effectLst>
+            <a:outerShdw blurRad="40000" dist="20000" dir="5400000" rotWithShape="0">
+              <a:srgbClr val="000000">
+                <a:alpha val="38000"/>
+              </a:srgbClr>
+            </a:outerShdw>
+          </a:effectLst>
+        </a:effectStyle>
+        <a:effectStyle>
+          <a:effectLst>
+            <a:outerShdw blurRad="40000" dist="23000" dir="5400000" rotWithShape="0">
+              <a:srgbClr val="000000">
+                <a:alpha val="35000"/>
+              </a:srgbClr>
+            </a:outerShdw>
+          </a:effectLst>
+        </a:effectStyle>
+        <a:effectStyle>
+          <a:effectLst>
+            <a:outerShdw blurRad="40000" dist="23000" dir="5400000" rotWithShape="0">
+              <a:srgbClr val="000000">
+                <a:alpha val="35000"/>
+              </a:srgbClr>
+            </a:outerShdw>
+          </a:effectLst>
+          <a:scene3d>
+            <a:camera prst="orthographicFront">
+              <a:rot lat="0" lon="0" rev="0"/>
+            </a:camera>
+            <a:lightRig rig="threePt" dir="t">
+              <a:rot lat="0" lon="0" rev="1200000"/>
+            </a:lightRig>
+          </a:scene3d>
+          <a:sp3d>
+            <a:bevelT w="63500" h="25400"/>
+          </a:sp3d>
+        </a:effectStyle>
+      </a:effectStyleLst>
+      <a:bgFillStyleLst>
+        <a:solidFill>
+          <a:schemeClr val="phClr"/>
+        </a:solidFill>
+        <a:gradFill rotWithShape="1">
+          <a:gsLst>
+            <a:gs pos="0">
+              <a:schemeClr val="phClr">
+                <a:tint val="40000"/>
+                <a:satMod val="350000"/>
+              </a:schemeClr>
+            </a:gs>
+            <a:gs pos="40000">
+              <a:schemeClr val="phClr">
+                <a:tint val="45000"/>
+                <a:shade val="99000"/>
+                <a:satMod val="350000"/>
+              </a:schemeClr>
+            </a:gs>
+            <a:gs pos="100000">
+              <a:schemeClr val="phClr">
+                <a:shade val="20000"/>
+                <a:satMod val="255000"/>
+              </a:schemeClr>
+            </a:gs>
+          </a:gsLst>
+          <a:path path="circle">
+            <a:fillToRect l="50000" t="-80000" r="50000" b="180000"/>
+          </a:path>
+        </a:gradFill>
+        <a:gradFill rotWithShape="1">
+          <a:gsLst>
+            <a:gs pos="0">
+              <a:schemeClr val="phClr">
+                <a:tint val="80000"/>
+                <a:satMod val="300000"/>
+              </a:schemeClr>
+            </a:gs>
+            <a:gs pos="100000">
+              <a:schemeClr val="phClr">
+                <a:shade val="30000"/>
+                <a:satMod val="200000"/>
+              </a:schemeClr>
+            </a:gs>
+          </a:gsLst>
+          <a:path path="circle">
+            <a:fillToRect l="50000" t="50000" r="50000" b="50000"/>
+          </a:path>
+        </a:gradFill>
+      </a:bgFillStyleLst>
+    </a:fmtScheme>
+  </a:themeElements>
+  <a:objectDefaults/>
+  <a:extraClrSchemeLst/>
+</a:theme>
 </file>
</xml_diff>